<commit_message>
modified report and ppt
</commit_message>
<xml_diff>
--- a/Final_Presentation_group03.pptx
+++ b/Final_Presentation_group03.pptx
@@ -286,7 +286,7 @@
             <a:fld id="{11A6662E-FAF4-44BC-88B5-85A7CBFB6D30}" type="datetime1">
               <a:rPr lang="en-US" smtClean="0"/>
               <a:pPr/>
-              <a:t>4/16/2021</a:t>
+              <a:t>4/17/2021</a:t>
             </a:fld>
             <a:endParaRPr lang="en-US" dirty="0"/>
           </a:p>
@@ -513,7 +513,7 @@
           <a:p>
             <a:fld id="{4C559632-1575-4E14-B53B-3DC3D5ED3947}" type="datetime1">
               <a:rPr lang="en-US" smtClean="0"/>
-              <a:t>4/16/2021</a:t>
+              <a:t>4/17/2021</a:t>
             </a:fld>
             <a:endParaRPr lang="en-US"/>
           </a:p>
@@ -721,7 +721,7 @@
           <a:p>
             <a:fld id="{CC4A6868-2568-4CC9-B302-F37117B01A6E}" type="datetime1">
               <a:rPr lang="en-US" smtClean="0"/>
-              <a:t>4/16/2021</a:t>
+              <a:t>4/17/2021</a:t>
             </a:fld>
             <a:endParaRPr lang="en-US"/>
           </a:p>
@@ -926,7 +926,7 @@
           <a:p>
             <a:fld id="{0055F08A-1E71-4B2B-BB49-E743F2903911}" type="datetime1">
               <a:rPr lang="en-US" smtClean="0"/>
-              <a:t>4/16/2021</a:t>
+              <a:t>4/17/2021</a:t>
             </a:fld>
             <a:endParaRPr lang="en-US" dirty="0"/>
           </a:p>
@@ -1200,7 +1200,7 @@
           <a:p>
             <a:fld id="{15417D9E-721A-44BB-8863-9873FE64DA75}" type="datetime1">
               <a:rPr lang="en-US" smtClean="0"/>
-              <a:t>4/16/2021</a:t>
+              <a:t>4/17/2021</a:t>
             </a:fld>
             <a:endParaRPr lang="en-US"/>
           </a:p>
@@ -1473,7 +1473,7 @@
           <a:p>
             <a:fld id="{5F31DA2F-80B8-49CF-99FB-5ABCA53A607A}" type="datetime1">
               <a:rPr lang="en-US" smtClean="0"/>
-              <a:t>4/16/2021</a:t>
+              <a:t>4/17/2021</a:t>
             </a:fld>
             <a:endParaRPr lang="en-US"/>
           </a:p>
@@ -1888,7 +1888,7 @@
           <a:p>
             <a:fld id="{28852172-E6C9-4B6C-929A-A9DE3837BBF1}" type="datetime1">
               <a:rPr lang="en-US" smtClean="0"/>
-              <a:t>4/16/2021</a:t>
+              <a:t>4/17/2021</a:t>
             </a:fld>
             <a:endParaRPr lang="en-US"/>
           </a:p>
@@ -2040,7 +2040,7 @@
           <a:p>
             <a:fld id="{3AB41CFF-90C9-47B3-9DA1-F2BF8D839F7E}" type="datetime1">
               <a:rPr lang="en-US" smtClean="0"/>
-              <a:t>4/16/2021</a:t>
+              <a:t>4/17/2021</a:t>
             </a:fld>
             <a:endParaRPr lang="en-US"/>
           </a:p>
@@ -2153,7 +2153,7 @@
           <a:p>
             <a:fld id="{F06048FA-06AB-4884-A69B-986B96E68A24}" type="datetime1">
               <a:rPr lang="en-US" smtClean="0"/>
-              <a:t>4/16/2021</a:t>
+              <a:t>4/17/2021</a:t>
             </a:fld>
             <a:endParaRPr lang="en-US"/>
           </a:p>
@@ -2464,7 +2464,7 @@
           <a:p>
             <a:fld id="{50DB7ABA-0172-4F9C-889D-567164F66BCD}" type="datetime1">
               <a:rPr lang="en-US" smtClean="0"/>
-              <a:t>4/16/2021</a:t>
+              <a:t>4/17/2021</a:t>
             </a:fld>
             <a:endParaRPr lang="en-US"/>
           </a:p>
@@ -2755,7 +2755,7 @@
           <a:p>
             <a:fld id="{78AC6A5B-8AE7-4A41-B5A7-9ADC6686DC18}" type="datetime1">
               <a:rPr lang="en-US" smtClean="0"/>
-              <a:t>4/16/2021</a:t>
+              <a:t>4/17/2021</a:t>
             </a:fld>
             <a:endParaRPr lang="en-US"/>
           </a:p>
@@ -3064,7 +3064,7 @@
             <a:fld id="{57E0CF6C-748E-4B7A-BC8B-3011EF78ED13}" type="datetime1">
               <a:rPr lang="en-US" smtClean="0"/>
               <a:pPr/>
-              <a:t>4/16/2021</a:t>
+              <a:t>4/17/2021</a:t>
             </a:fld>
             <a:endParaRPr lang="en-US" dirty="0"/>
           </a:p>
@@ -4389,7 +4389,7 @@
         </p:blipFill>
         <p:spPr>
           <a:xfrm>
-            <a:off x="793588" y="2393761"/>
+            <a:off x="805502" y="3779197"/>
             <a:ext cx="3483583" cy="2121729"/>
           </a:xfrm>
         </p:spPr>
@@ -4416,8 +4416,8 @@
         </p:blipFill>
         <p:spPr>
           <a:xfrm>
-            <a:off x="4861768" y="1802997"/>
-            <a:ext cx="6851202" cy="3303258"/>
+            <a:off x="4668591" y="1691322"/>
+            <a:ext cx="7348323" cy="4209603"/>
           </a:xfrm>
           <a:prstGeom prst="rect">
             <a:avLst/>
@@ -4438,7 +4438,7 @@
         </p:nvSpPr>
         <p:spPr>
           <a:xfrm>
-            <a:off x="1555215" y="4598423"/>
+            <a:off x="1448309" y="6175142"/>
             <a:ext cx="2197971" cy="369332"/>
           </a:xfrm>
           <a:prstGeom prst="rect">
@@ -4473,7 +4473,7 @@
         </p:nvSpPr>
         <p:spPr>
           <a:xfrm>
-            <a:off x="7068621" y="5363379"/>
+            <a:off x="7068621" y="6175142"/>
             <a:ext cx="4212404" cy="369332"/>
           </a:xfrm>
           <a:prstGeom prst="rect">
@@ -4494,6 +4494,257 @@
           </a:p>
         </p:txBody>
       </p:sp>
+      <p:graphicFrame>
+        <p:nvGraphicFramePr>
+          <p:cNvPr id="10" name="Table 4">
+            <a:extLst>
+              <a:ext uri="{FF2B5EF4-FFF2-40B4-BE49-F238E27FC236}">
+                <a16:creationId xmlns:a16="http://schemas.microsoft.com/office/drawing/2014/main" id="{569CB1AC-08DE-46DE-B46C-7D0E7D1A042D}"/>
+              </a:ext>
+            </a:extLst>
+          </p:cNvPr>
+          <p:cNvGraphicFramePr>
+            <a:graphicFrameLocks noGrp="1"/>
+          </p:cNvGraphicFramePr>
+          <p:nvPr>
+            <p:extLst>
+              <p:ext uri="{D42A27DB-BD31-4B8C-83A1-F6EECF244321}">
+                <p14:modId xmlns:p14="http://schemas.microsoft.com/office/powerpoint/2010/main" val="1132956079"/>
+              </p:ext>
+            </p:extLst>
+          </p:nvPr>
+        </p:nvGraphicFramePr>
+        <p:xfrm>
+          <a:off x="838200" y="1687913"/>
+          <a:ext cx="2243994" cy="1906560"/>
+        </p:xfrm>
+        <a:graphic>
+          <a:graphicData uri="http://schemas.openxmlformats.org/drawingml/2006/table">
+            <a:tbl>
+              <a:tblPr firstRow="1" bandRow="1">
+                <a:tableStyleId>{5C22544A-7EE6-4342-B048-85BDC9FD1C3A}</a:tableStyleId>
+              </a:tblPr>
+              <a:tblGrid>
+                <a:gridCol w="1121997">
+                  <a:extLst>
+                    <a:ext uri="{9D8B030D-6E8A-4147-A177-3AD203B41FA5}">
+                      <a16:colId xmlns:a16="http://schemas.microsoft.com/office/drawing/2014/main" val="2503213547"/>
+                    </a:ext>
+                  </a:extLst>
+                </a:gridCol>
+                <a:gridCol w="1121997">
+                  <a:extLst>
+                    <a:ext uri="{9D8B030D-6E8A-4147-A177-3AD203B41FA5}">
+                      <a16:colId xmlns:a16="http://schemas.microsoft.com/office/drawing/2014/main" val="1460707732"/>
+                    </a:ext>
+                  </a:extLst>
+                </a:gridCol>
+              </a:tblGrid>
+              <a:tr h="317760">
+                <a:tc>
+                  <a:txBody>
+                    <a:bodyPr/>
+                    <a:lstStyle/>
+                    <a:p>
+                      <a:r>
+                        <a:rPr lang="en-IN" sz="1400" dirty="0"/>
+                        <a:t>Label</a:t>
+                      </a:r>
+                    </a:p>
+                  </a:txBody>
+                  <a:tcPr/>
+                </a:tc>
+                <a:tc>
+                  <a:txBody>
+                    <a:bodyPr/>
+                    <a:lstStyle/>
+                    <a:p>
+                      <a:r>
+                        <a:rPr lang="en-IN" sz="1400" dirty="0"/>
+                        <a:t>Person</a:t>
+                      </a:r>
+                    </a:p>
+                  </a:txBody>
+                  <a:tcPr/>
+                </a:tc>
+                <a:extLst>
+                  <a:ext uri="{0D108BD9-81ED-4DB2-BD59-A6C34878D82A}">
+                    <a16:rowId xmlns:a16="http://schemas.microsoft.com/office/drawing/2014/main" val="361299399"/>
+                  </a:ext>
+                </a:extLst>
+              </a:tr>
+              <a:tr h="317760">
+                <a:tc>
+                  <a:txBody>
+                    <a:bodyPr/>
+                    <a:lstStyle/>
+                    <a:p>
+                      <a:r>
+                        <a:rPr lang="en-IN" sz="1400" dirty="0"/>
+                        <a:t>0</a:t>
+                      </a:r>
+                    </a:p>
+                  </a:txBody>
+                  <a:tcPr/>
+                </a:tc>
+                <a:tc>
+                  <a:txBody>
+                    <a:bodyPr/>
+                    <a:lstStyle/>
+                    <a:p>
+                      <a:r>
+                        <a:rPr lang="en-IN" sz="1400" dirty="0"/>
+                        <a:t>Chetana</a:t>
+                      </a:r>
+                    </a:p>
+                  </a:txBody>
+                  <a:tcPr/>
+                </a:tc>
+                <a:extLst>
+                  <a:ext uri="{0D108BD9-81ED-4DB2-BD59-A6C34878D82A}">
+                    <a16:rowId xmlns:a16="http://schemas.microsoft.com/office/drawing/2014/main" val="731106144"/>
+                  </a:ext>
+                </a:extLst>
+              </a:tr>
+              <a:tr h="317760">
+                <a:tc>
+                  <a:txBody>
+                    <a:bodyPr/>
+                    <a:lstStyle/>
+                    <a:p>
+                      <a:r>
+                        <a:rPr lang="en-IN" sz="1400" dirty="0"/>
+                        <a:t>1</a:t>
+                      </a:r>
+                    </a:p>
+                  </a:txBody>
+                  <a:tcPr/>
+                </a:tc>
+                <a:tc>
+                  <a:txBody>
+                    <a:bodyPr/>
+                    <a:lstStyle/>
+                    <a:p>
+                      <a:r>
+                        <a:rPr lang="en-IN" sz="1400" dirty="0" err="1"/>
+                        <a:t>Prabhleen</a:t>
+                      </a:r>
+                      <a:endParaRPr lang="en-IN" sz="1400" dirty="0"/>
+                    </a:p>
+                  </a:txBody>
+                  <a:tcPr/>
+                </a:tc>
+                <a:extLst>
+                  <a:ext uri="{0D108BD9-81ED-4DB2-BD59-A6C34878D82A}">
+                    <a16:rowId xmlns:a16="http://schemas.microsoft.com/office/drawing/2014/main" val="4135742616"/>
+                  </a:ext>
+                </a:extLst>
+              </a:tr>
+              <a:tr h="317760">
+                <a:tc>
+                  <a:txBody>
+                    <a:bodyPr/>
+                    <a:lstStyle/>
+                    <a:p>
+                      <a:r>
+                        <a:rPr lang="en-IN" sz="1400" dirty="0"/>
+                        <a:t>2</a:t>
+                      </a:r>
+                    </a:p>
+                  </a:txBody>
+                  <a:tcPr/>
+                </a:tc>
+                <a:tc>
+                  <a:txBody>
+                    <a:bodyPr/>
+                    <a:lstStyle/>
+                    <a:p>
+                      <a:r>
+                        <a:rPr lang="en-IN" sz="1400" dirty="0" err="1"/>
+                        <a:t>Sanyam</a:t>
+                      </a:r>
+                      <a:endParaRPr lang="en-IN" sz="1400" dirty="0"/>
+                    </a:p>
+                  </a:txBody>
+                  <a:tcPr/>
+                </a:tc>
+                <a:extLst>
+                  <a:ext uri="{0D108BD9-81ED-4DB2-BD59-A6C34878D82A}">
+                    <a16:rowId xmlns:a16="http://schemas.microsoft.com/office/drawing/2014/main" val="2868506097"/>
+                  </a:ext>
+                </a:extLst>
+              </a:tr>
+              <a:tr h="317760">
+                <a:tc>
+                  <a:txBody>
+                    <a:bodyPr/>
+                    <a:lstStyle/>
+                    <a:p>
+                      <a:r>
+                        <a:rPr lang="en-IN" sz="1400" dirty="0"/>
+                        <a:t>3</a:t>
+                      </a:r>
+                    </a:p>
+                  </a:txBody>
+                  <a:tcPr/>
+                </a:tc>
+                <a:tc>
+                  <a:txBody>
+                    <a:bodyPr/>
+                    <a:lstStyle/>
+                    <a:p>
+                      <a:r>
+                        <a:rPr lang="en-IN" sz="1400" dirty="0" err="1"/>
+                        <a:t>Taruneesh</a:t>
+                      </a:r>
+                      <a:endParaRPr lang="en-IN" sz="1400" dirty="0"/>
+                    </a:p>
+                  </a:txBody>
+                  <a:tcPr/>
+                </a:tc>
+                <a:extLst>
+                  <a:ext uri="{0D108BD9-81ED-4DB2-BD59-A6C34878D82A}">
+                    <a16:rowId xmlns:a16="http://schemas.microsoft.com/office/drawing/2014/main" val="3503290381"/>
+                  </a:ext>
+                </a:extLst>
+              </a:tr>
+              <a:tr h="317760">
+                <a:tc>
+                  <a:txBody>
+                    <a:bodyPr/>
+                    <a:lstStyle/>
+                    <a:p>
+                      <a:r>
+                        <a:rPr lang="en-IN" sz="1400" dirty="0"/>
+                        <a:t>4</a:t>
+                      </a:r>
+                    </a:p>
+                  </a:txBody>
+                  <a:tcPr/>
+                </a:tc>
+                <a:tc>
+                  <a:txBody>
+                    <a:bodyPr/>
+                    <a:lstStyle/>
+                    <a:p>
+                      <a:r>
+                        <a:rPr lang="en-IN" sz="1400" dirty="0"/>
+                        <a:t>Neha</a:t>
+                      </a:r>
+                    </a:p>
+                  </a:txBody>
+                  <a:tcPr/>
+                </a:tc>
+                <a:extLst>
+                  <a:ext uri="{0D108BD9-81ED-4DB2-BD59-A6C34878D82A}">
+                    <a16:rowId xmlns:a16="http://schemas.microsoft.com/office/drawing/2014/main" val="1353949187"/>
+                  </a:ext>
+                </a:extLst>
+              </a:tr>
+            </a:tbl>
+          </a:graphicData>
+        </a:graphic>
+      </p:graphicFrame>
     </p:spTree>
     <p:extLst>
       <p:ext uri="{BB962C8B-B14F-4D97-AF65-F5344CB8AC3E}">
@@ -4584,7 +4835,7 @@
             </a:pPr>
             <a:r>
               <a:rPr lang="en-CA" dirty="0"/>
-              <a:t>The approach followed by the team to implement the face detection is by converting the images to the NumPy arrays. This approach is bit slow and takes a lot of time in building the NumPy arrays. However, team was able to implement the project using a decent dataset of around 10,000 pair of datasets, on which model is trained.</a:t>
+              <a:t>The approach followed by the team to implement the face detection is by converting the images to the NumPy arrays. This approach is slow and takes a lot of time in building the NumPy arrays. However, team was able to implement the project using a decent dataset of around 10,000 pair of images, on which model is trained.</a:t>
             </a:r>
           </a:p>
           <a:p>
@@ -4608,7 +4859,7 @@
             </a:r>
             <a:r>
               <a:rPr lang="en-CA" dirty="0"/>
-              <a:t> has a limit on the number of resources you can use, thus training a model with different number of possibilities is bit difficult.</a:t>
+              <a:t> has a limit on the number of resources we can use i.e. GPU runtime, thus it becomes difficult to train a model for different set of hyperparameters for a longer duration.</a:t>
             </a:r>
           </a:p>
         </p:txBody>
@@ -5320,13 +5571,19 @@
           <a:p>
             <a:r>
               <a:rPr lang="en-US" dirty="0"/>
-              <a:t>Training Dataset: 5 images per team member</a:t>
+              <a:t>Initial Dataset: 5 images per team member</a:t>
             </a:r>
           </a:p>
           <a:p>
             <a:r>
               <a:rPr lang="en-US" dirty="0"/>
-              <a:t>Augmented Training Dataset: 20 images per team member (100 images)</a:t>
+              <a:t>Augmented Dataset: 20 images per team member (100 images)</a:t>
+            </a:r>
+          </a:p>
+          <a:p>
+            <a:r>
+              <a:rPr lang="en-US" dirty="0"/>
+              <a:t>Training Dataset: 10,000 pair of images.</a:t>
             </a:r>
           </a:p>
           <a:p>
@@ -6128,7 +6385,7 @@
           <a:p>
             <a:r>
               <a:rPr lang="en-US" dirty="0"/>
-              <a:t>Model is trained with the different batch size, epochs, and different spit ratio of training and validation data.</a:t>
+              <a:t>Model is trained with the different batch size, epochs, and different split ratio of training and validation data.</a:t>
             </a:r>
           </a:p>
           <a:p>
@@ -6584,7 +6841,7 @@
         </p:blipFill>
         <p:spPr>
           <a:xfrm>
-            <a:off x="1195842" y="1400211"/>
+            <a:off x="79706" y="1400211"/>
             <a:ext cx="12032587" cy="4770315"/>
           </a:xfrm>
         </p:spPr>

</xml_diff>